<commit_message>
adding week of experiments and analyses
</commit_message>
<xml_diff>
--- a/presentations_proposals/20200813_surf_poster_pres.pptx
+++ b/presentations_proposals/20200813_surf_poster_pres.pptx
@@ -208,7 +208,7 @@
           <a:p>
             <a:fld id="{D0122DAE-40C7-2D42-B6C8-B9C4D6CB2DF1}" type="datetimeFigureOut">
               <a:rPr lang="en-US" smtClean="0"/>
-              <a:t>8/20/20</a:t>
+              <a:t>11/30/20</a:t>
             </a:fld>
             <a:endParaRPr lang="en-US"/>
           </a:p>
@@ -706,7 +706,7 @@
           <a:p>
             <a:fld id="{985D6BDF-9D0E-4E2B-85B8-D8F4790360C9}" type="datetimeFigureOut">
               <a:rPr lang="en-US" smtClean="0"/>
-              <a:t>8/20/20</a:t>
+              <a:t>11/30/20</a:t>
             </a:fld>
             <a:endParaRPr lang="en-US" dirty="0"/>
           </a:p>
@@ -904,7 +904,7 @@
           <a:p>
             <a:fld id="{985D6BDF-9D0E-4E2B-85B8-D8F4790360C9}" type="datetimeFigureOut">
               <a:rPr lang="en-US" smtClean="0"/>
-              <a:t>8/20/20</a:t>
+              <a:t>11/30/20</a:t>
             </a:fld>
             <a:endParaRPr lang="en-US" dirty="0"/>
           </a:p>
@@ -1112,7 +1112,7 @@
           <a:p>
             <a:fld id="{985D6BDF-9D0E-4E2B-85B8-D8F4790360C9}" type="datetimeFigureOut">
               <a:rPr lang="en-US" smtClean="0"/>
-              <a:t>8/20/20</a:t>
+              <a:t>11/30/20</a:t>
             </a:fld>
             <a:endParaRPr lang="en-US" dirty="0"/>
           </a:p>
@@ -2793,7 +2793,7 @@
           <a:p>
             <a:fld id="{985D6BDF-9D0E-4E2B-85B8-D8F4790360C9}" type="datetimeFigureOut">
               <a:rPr lang="en-US" smtClean="0"/>
-              <a:t>8/20/20</a:t>
+              <a:t>11/30/20</a:t>
             </a:fld>
             <a:endParaRPr lang="en-US" dirty="0"/>
           </a:p>
@@ -3068,7 +3068,7 @@
           <a:p>
             <a:fld id="{985D6BDF-9D0E-4E2B-85B8-D8F4790360C9}" type="datetimeFigureOut">
               <a:rPr lang="en-US" smtClean="0"/>
-              <a:t>8/20/20</a:t>
+              <a:t>11/30/20</a:t>
             </a:fld>
             <a:endParaRPr lang="en-US" dirty="0"/>
           </a:p>
@@ -3333,7 +3333,7 @@
           <a:p>
             <a:fld id="{985D6BDF-9D0E-4E2B-85B8-D8F4790360C9}" type="datetimeFigureOut">
               <a:rPr lang="en-US" smtClean="0"/>
-              <a:t>8/20/20</a:t>
+              <a:t>11/30/20</a:t>
             </a:fld>
             <a:endParaRPr lang="en-US" dirty="0"/>
           </a:p>
@@ -3745,7 +3745,7 @@
           <a:p>
             <a:fld id="{985D6BDF-9D0E-4E2B-85B8-D8F4790360C9}" type="datetimeFigureOut">
               <a:rPr lang="en-US" smtClean="0"/>
-              <a:t>8/20/20</a:t>
+              <a:t>11/30/20</a:t>
             </a:fld>
             <a:endParaRPr lang="en-US" dirty="0"/>
           </a:p>
@@ -3886,7 +3886,7 @@
           <a:p>
             <a:fld id="{985D6BDF-9D0E-4E2B-85B8-D8F4790360C9}" type="datetimeFigureOut">
               <a:rPr lang="en-US" smtClean="0"/>
-              <a:t>8/20/20</a:t>
+              <a:t>11/30/20</a:t>
             </a:fld>
             <a:endParaRPr lang="en-US" dirty="0"/>
           </a:p>
@@ -3999,7 +3999,7 @@
           <a:p>
             <a:fld id="{985D6BDF-9D0E-4E2B-85B8-D8F4790360C9}" type="datetimeFigureOut">
               <a:rPr lang="en-US" smtClean="0"/>
-              <a:t>8/20/20</a:t>
+              <a:t>11/30/20</a:t>
             </a:fld>
             <a:endParaRPr lang="en-US" dirty="0"/>
           </a:p>
@@ -4310,7 +4310,7 @@
           <a:p>
             <a:fld id="{985D6BDF-9D0E-4E2B-85B8-D8F4790360C9}" type="datetimeFigureOut">
               <a:rPr lang="en-US" smtClean="0"/>
-              <a:t>8/20/20</a:t>
+              <a:t>11/30/20</a:t>
             </a:fld>
             <a:endParaRPr lang="en-US" dirty="0"/>
           </a:p>
@@ -4598,7 +4598,7 @@
           <a:p>
             <a:fld id="{985D6BDF-9D0E-4E2B-85B8-D8F4790360C9}" type="datetimeFigureOut">
               <a:rPr lang="en-US" smtClean="0"/>
-              <a:t>8/20/20</a:t>
+              <a:t>11/30/20</a:t>
             </a:fld>
             <a:endParaRPr lang="en-US" dirty="0"/>
           </a:p>
@@ -4839,7 +4839,7 @@
           <a:p>
             <a:fld id="{985D6BDF-9D0E-4E2B-85B8-D8F4790360C9}" type="datetimeFigureOut">
               <a:rPr lang="en-US" smtClean="0"/>
-              <a:t>8/20/20</a:t>
+              <a:t>11/30/20</a:t>
             </a:fld>
             <a:endParaRPr lang="en-US" dirty="0"/>
           </a:p>
@@ -9028,7 +9028,7 @@
         <p:spPr>
           <a:xfrm>
             <a:off x="1136110" y="36620716"/>
-            <a:ext cx="11967997" cy="1992847"/>
+            <a:ext cx="11967997" cy="1746626"/>
           </a:xfrm>
           <a:prstGeom prst="rect">
             <a:avLst/>
@@ -9064,10 +9064,13 @@
             </a:r>
           </a:p>
           <a:p>
-            <a:endParaRPr lang="en-US" sz="4800" dirty="0">
-              <a:latin typeface="Avenir Book" panose="02000503020000020003" pitchFamily="2" charset="0"/>
-              <a:ea typeface="Cambria Math" panose="02040503050406030204" pitchFamily="18" charset="0"/>
-            </a:endParaRPr>
+            <a:r>
+              <a:rPr lang="en-US" sz="2800" dirty="0">
+                <a:latin typeface="Avenir Book" panose="02000503020000020003" pitchFamily="2" charset="0"/>
+                <a:ea typeface="Cambria Math" panose="02040503050406030204" pitchFamily="18" charset="0"/>
+              </a:rPr>
+              <a:t>8.19.2020</a:t>
+            </a:r>
           </a:p>
           <a:p>
             <a:r>

</xml_diff>